<commit_message>
Final presentation with notes
</commit_message>
<xml_diff>
--- a/doc/presentation/IDDR.pptx
+++ b/doc/presentation/IDDR.pptx
@@ -282,7 +282,7 @@
           <a:p>
             <a:fld id="{C6AFE97B-C4B1-41BF-AE6B-8CBC991743C2}" type="datetimeFigureOut">
               <a:rPr lang="en-US" smtClean="0"/>
-              <a:t>4/14/2014</a:t>
+              <a:t>4/15/2014</a:t>
             </a:fld>
             <a:endParaRPr lang="en-US"/>
           </a:p>
@@ -769,7 +769,6 @@
               <a:rPr lang="en-US" b="1" baseline="0" dirty="0" smtClean="0"/>
               <a:t>… to achieve compatibility goal …</a:t>
             </a:r>
-            <a:endParaRPr lang="en-US" b="1" baseline="0" dirty="0" smtClean="0"/>
           </a:p>
         </p:txBody>
       </p:sp>
@@ -2054,7 +2053,43 @@
                 <a:ea typeface="+mn-ea"/>
                 <a:cs typeface="+mn-cs"/>
               </a:rPr>
-              <a:t>Network driver, display Driver, SATA driver</a:t>
+              <a:t>Ethernet </a:t>
+            </a:r>
+            <a:r>
+              <a:rPr lang="en-US" sz="1200" kern="1200" dirty="0" smtClean="0">
+                <a:solidFill>
+                  <a:schemeClr val="tx1"/>
+                </a:solidFill>
+                <a:effectLst/>
+                <a:latin typeface="+mn-lt"/>
+                <a:ea typeface="+mn-ea"/>
+                <a:cs typeface="+mn-cs"/>
+              </a:rPr>
+              <a:t>driver, display Driver, </a:t>
+            </a:r>
+            <a:r>
+              <a:rPr lang="en-US" sz="1200" kern="1200" smtClean="0">
+                <a:solidFill>
+                  <a:schemeClr val="tx1"/>
+                </a:solidFill>
+                <a:effectLst/>
+                <a:latin typeface="+mn-lt"/>
+                <a:ea typeface="+mn-ea"/>
+                <a:cs typeface="+mn-cs"/>
+              </a:rPr>
+              <a:t>Bluetooth driver, SATA </a:t>
+            </a:r>
+            <a:r>
+              <a:rPr lang="en-US" sz="1200" kern="1200" dirty="0" smtClean="0">
+                <a:solidFill>
+                  <a:schemeClr val="tx1"/>
+                </a:solidFill>
+                <a:effectLst/>
+                <a:latin typeface="+mn-lt"/>
+                <a:ea typeface="+mn-ea"/>
+                <a:cs typeface="+mn-cs"/>
+              </a:rPr>
+              <a:t>driver</a:t>
             </a:r>
           </a:p>
           <a:p>
@@ -4192,7 +4227,6 @@
               <a:rPr lang="en-US" b="1" baseline="0" dirty="0" smtClean="0"/>
               <a:t>And backend runs in the driver domain.</a:t>
             </a:r>
-            <a:endParaRPr lang="en-US" b="1" baseline="0" dirty="0" smtClean="0"/>
           </a:p>
         </p:txBody>
       </p:sp>
@@ -4432,7 +4466,7 @@
           <a:p>
             <a:fld id="{B820227A-62C6-4B56-9A97-B1CB3B15378B}" type="datetime1">
               <a:rPr lang="en-US" smtClean="0"/>
-              <a:t>4/14/2014</a:t>
+              <a:t>4/15/2014</a:t>
             </a:fld>
             <a:endParaRPr lang="en-US"/>
           </a:p>
@@ -4622,7 +4656,7 @@
           <a:p>
             <a:fld id="{632B489D-0430-47F0-955C-DABF37EC2B75}" type="datetime1">
               <a:rPr lang="en-US" smtClean="0"/>
-              <a:t>4/14/2014</a:t>
+              <a:t>4/15/2014</a:t>
             </a:fld>
             <a:endParaRPr lang="en-US"/>
           </a:p>
@@ -4802,7 +4836,7 @@
           <a:p>
             <a:fld id="{465D38B7-63FB-4E15-9EE9-234BAA6C2544}" type="datetime1">
               <a:rPr lang="en-US" smtClean="0"/>
-              <a:t>4/14/2014</a:t>
+              <a:t>4/15/2014</a:t>
             </a:fld>
             <a:endParaRPr lang="en-US"/>
           </a:p>
@@ -4972,7 +5006,7 @@
           <a:p>
             <a:fld id="{D2E99676-02CB-4B64-AB96-1DE36C923FA8}" type="datetime1">
               <a:rPr lang="en-US" smtClean="0"/>
-              <a:t>4/14/2014</a:t>
+              <a:t>4/15/2014</a:t>
             </a:fld>
             <a:endParaRPr lang="en-US"/>
           </a:p>
@@ -5228,7 +5262,7 @@
           <a:p>
             <a:fld id="{9266F805-31C0-4268-B26C-7FC4FD3A4BAD}" type="datetime1">
               <a:rPr lang="en-US" smtClean="0"/>
-              <a:t>4/14/2014</a:t>
+              <a:t>4/15/2014</a:t>
             </a:fld>
             <a:endParaRPr lang="en-US"/>
           </a:p>
@@ -5516,7 +5550,7 @@
           <a:p>
             <a:fld id="{52539E47-C7EB-4311-826F-61E7475E8724}" type="datetime1">
               <a:rPr lang="en-US" smtClean="0"/>
-              <a:t>4/14/2014</a:t>
+              <a:t>4/15/2014</a:t>
             </a:fld>
             <a:endParaRPr lang="en-US"/>
           </a:p>
@@ -5954,7 +5988,7 @@
           <a:p>
             <a:fld id="{2E5749F5-690F-41D1-928F-FD2F4F037969}" type="datetime1">
               <a:rPr lang="en-US" smtClean="0"/>
-              <a:t>4/14/2014</a:t>
+              <a:t>4/15/2014</a:t>
             </a:fld>
             <a:endParaRPr lang="en-US"/>
           </a:p>
@@ -6072,7 +6106,7 @@
           <a:p>
             <a:fld id="{F99A36AF-0546-4E44-8ABD-046692AAD695}" type="datetime1">
               <a:rPr lang="en-US" smtClean="0"/>
-              <a:t>4/14/2014</a:t>
+              <a:t>4/15/2014</a:t>
             </a:fld>
             <a:endParaRPr lang="en-US"/>
           </a:p>
@@ -6167,7 +6201,7 @@
           <a:p>
             <a:fld id="{E5FAFFFB-6F7D-47B4-B344-ACC3ABE125BB}" type="datetime1">
               <a:rPr lang="en-US" smtClean="0"/>
-              <a:t>4/14/2014</a:t>
+              <a:t>4/15/2014</a:t>
             </a:fld>
             <a:endParaRPr lang="en-US"/>
           </a:p>
@@ -6523,7 +6557,7 @@
           <a:p>
             <a:fld id="{D81FE25C-C682-423E-8A2E-5496534155DF}" type="datetime1">
               <a:rPr lang="en-US" smtClean="0"/>
-              <a:t>4/14/2014</a:t>
+              <a:t>4/15/2014</a:t>
             </a:fld>
             <a:endParaRPr lang="en-US"/>
           </a:p>
@@ -6842,7 +6876,7 @@
           <a:p>
             <a:fld id="{8F0C33C9-B8F4-4E4B-8D72-287CAE84BC44}" type="datetime1">
               <a:rPr lang="en-US" smtClean="0"/>
-              <a:t>4/14/2014</a:t>
+              <a:t>4/15/2014</a:t>
             </a:fld>
             <a:endParaRPr lang="en-US"/>
           </a:p>
@@ -7075,7 +7109,7 @@
           <a:p>
             <a:fld id="{A62444FF-0B7E-4ECB-B4F5-05B6C69F169A}" type="datetime1">
               <a:rPr lang="en-US" smtClean="0"/>
-              <a:t>4/14/2014</a:t>
+              <a:t>4/15/2014</a:t>
             </a:fld>
             <a:endParaRPr lang="en-US"/>
           </a:p>
@@ -20628,15 +20662,7 @@
           <a:p>
             <a:r>
               <a:rPr lang="en-US" sz="4400" dirty="0" smtClean="0"/>
-              <a:t>Split device driver vs IDDR system </a:t>
-            </a:r>
-            <a:r>
-              <a:rPr lang="en-US" sz="4400" dirty="0" smtClean="0"/>
-              <a:t>(RAM disk</a:t>
-            </a:r>
-            <a:r>
-              <a:rPr lang="en-US" sz="4400" dirty="0" smtClean="0"/>
-              <a:t>)</a:t>
+              <a:t>Split device driver vs IDDR system (RAM disk)</a:t>
             </a:r>
             <a:endParaRPr lang="en-US" sz="4400" dirty="0"/>
           </a:p>

</xml_diff>